<commit_message>
20190921 state diagram (에어컨)
</commit_message>
<xml_diff>
--- a/UML/10_객체UML(스테이트).pptx
+++ b/UML/10_객체UML(스테이트).pptx
@@ -4311,9 +4311,13 @@
           </a:p>
           <a:p>
             <a:r>
-              <a:rPr lang="ko-KR" altLang="en-US" dirty="0"/>
+              <a:rPr lang="ko-KR" altLang="en-US" dirty="0" smtClean="0"/>
               <a:t>상태</a:t>
             </a:r>
+            <a:r>
+              <a:rPr lang="en-US" altLang="ko-KR" smtClean="0"/>
+              <a:t>(state)</a:t>
+            </a:r>
             <a:endParaRPr lang="en-US" altLang="ko-KR" dirty="0"/>
           </a:p>
           <a:p>
@@ -4326,8 +4330,20 @@
           </a:p>
           <a:p>
             <a:r>
-              <a:rPr lang="ko-KR" altLang="en-US" dirty="0"/>
+              <a:rPr lang="ko-KR" altLang="en-US" dirty="0" smtClean="0"/>
               <a:t>상태전이</a:t>
+            </a:r>
+            <a:r>
+              <a:rPr lang="en-US" altLang="ko-KR" dirty="0" smtClean="0"/>
+              <a:t>(</a:t>
+            </a:r>
+            <a:r>
+              <a:rPr lang="en-US" altLang="ko-KR" dirty="0" smtClean="0"/>
+              <a:t>transition</a:t>
+            </a:r>
+            <a:r>
+              <a:rPr lang="en-US" altLang="ko-KR" dirty="0" smtClean="0"/>
+              <a:t>)</a:t>
             </a:r>
             <a:endParaRPr lang="en-US" altLang="ko-KR" dirty="0"/>
           </a:p>
@@ -4890,11 +4906,7 @@
             </a:r>
             <a:r>
               <a:rPr lang="ko-KR" altLang="en-US" dirty="0" smtClean="0"/>
-              <a:t> </a:t>
-            </a:r>
-            <a:r>
-              <a:rPr lang="ko-KR" altLang="en-US" dirty="0" smtClean="0"/>
-              <a:t>다이어그램</a:t>
+              <a:t> 다이어그램</a:t>
             </a:r>
             <a:endParaRPr lang="en-US" altLang="ko-KR" dirty="0" smtClean="0"/>
           </a:p>
@@ -5006,11 +5018,6 @@
               </a:rPr>
               <a:t>)</a:t>
             </a:r>
-            <a:endParaRPr lang="en-US" altLang="ko-KR" dirty="0" smtClean="0">
-              <a:solidFill>
-                <a:srgbClr val="FF0000"/>
-              </a:solidFill>
-            </a:endParaRPr>
           </a:p>
           <a:p>
             <a:endParaRPr lang="en-US" altLang="ko-KR" dirty="0"/>

</xml_diff>